<commit_message>
It’s official, I suck at CSS.
</commit_message>
<xml_diff>
--- a/etc/icons.pptx
+++ b/etc/icons.pptx
@@ -5,11 +5,12 @@
     <p:sldMasterId id="2147483648" r:id="rId1"/>
   </p:sldMasterIdLst>
   <p:notesMasterIdLst>
-    <p:notesMasterId r:id="rId4"/>
+    <p:notesMasterId r:id="rId5"/>
   </p:notesMasterIdLst>
   <p:sldIdLst>
     <p:sldId id="256" r:id="rId2"/>
     <p:sldId id="257" r:id="rId3"/>
+    <p:sldId id="258" r:id="rId4"/>
   </p:sldIdLst>
   <p:sldSz cx="12192000" cy="6858000"/>
   <p:notesSz cx="6858000" cy="9144000"/>
@@ -198,7 +199,7 @@
           <a:p>
             <a:fld id="{89161C84-31DC-3C4C-B41C-DEE53EA491CB}" type="datetimeFigureOut">
               <a:rPr lang="en-US" smtClean="0"/>
-              <a:t>3/19/17</a:t>
+              <a:t>4/1/17</a:t>
             </a:fld>
             <a:endParaRPr lang="en-US"/>
           </a:p>
@@ -597,7 +598,7 @@
           <a:p>
             <a:fld id="{9C93B30E-FFF9-5B40-B7BA-CE3AAAF23754}" type="datetimeFigureOut">
               <a:rPr lang="en-US" smtClean="0"/>
-              <a:t>3/19/17</a:t>
+              <a:t>4/1/17</a:t>
             </a:fld>
             <a:endParaRPr lang="en-US"/>
           </a:p>
@@ -767,7 +768,7 @@
           <a:p>
             <a:fld id="{9C93B30E-FFF9-5B40-B7BA-CE3AAAF23754}" type="datetimeFigureOut">
               <a:rPr lang="en-US" smtClean="0"/>
-              <a:t>3/19/17</a:t>
+              <a:t>4/1/17</a:t>
             </a:fld>
             <a:endParaRPr lang="en-US"/>
           </a:p>
@@ -947,7 +948,7 @@
           <a:p>
             <a:fld id="{9C93B30E-FFF9-5B40-B7BA-CE3AAAF23754}" type="datetimeFigureOut">
               <a:rPr lang="en-US" smtClean="0"/>
-              <a:t>3/19/17</a:t>
+              <a:t>4/1/17</a:t>
             </a:fld>
             <a:endParaRPr lang="en-US"/>
           </a:p>
@@ -1117,7 +1118,7 @@
           <a:p>
             <a:fld id="{9C93B30E-FFF9-5B40-B7BA-CE3AAAF23754}" type="datetimeFigureOut">
               <a:rPr lang="en-US" smtClean="0"/>
-              <a:t>3/19/17</a:t>
+              <a:t>4/1/17</a:t>
             </a:fld>
             <a:endParaRPr lang="en-US"/>
           </a:p>
@@ -1363,7 +1364,7 @@
           <a:p>
             <a:fld id="{9C93B30E-FFF9-5B40-B7BA-CE3AAAF23754}" type="datetimeFigureOut">
               <a:rPr lang="en-US" smtClean="0"/>
-              <a:t>3/19/17</a:t>
+              <a:t>4/1/17</a:t>
             </a:fld>
             <a:endParaRPr lang="en-US"/>
           </a:p>
@@ -1595,7 +1596,7 @@
           <a:p>
             <a:fld id="{9C93B30E-FFF9-5B40-B7BA-CE3AAAF23754}" type="datetimeFigureOut">
               <a:rPr lang="en-US" smtClean="0"/>
-              <a:t>3/19/17</a:t>
+              <a:t>4/1/17</a:t>
             </a:fld>
             <a:endParaRPr lang="en-US"/>
           </a:p>
@@ -1962,7 +1963,7 @@
           <a:p>
             <a:fld id="{9C93B30E-FFF9-5B40-B7BA-CE3AAAF23754}" type="datetimeFigureOut">
               <a:rPr lang="en-US" smtClean="0"/>
-              <a:t>3/19/17</a:t>
+              <a:t>4/1/17</a:t>
             </a:fld>
             <a:endParaRPr lang="en-US"/>
           </a:p>
@@ -2080,7 +2081,7 @@
           <a:p>
             <a:fld id="{9C93B30E-FFF9-5B40-B7BA-CE3AAAF23754}" type="datetimeFigureOut">
               <a:rPr lang="en-US" smtClean="0"/>
-              <a:t>3/19/17</a:t>
+              <a:t>4/1/17</a:t>
             </a:fld>
             <a:endParaRPr lang="en-US"/>
           </a:p>
@@ -2175,7 +2176,7 @@
           <a:p>
             <a:fld id="{9C93B30E-FFF9-5B40-B7BA-CE3AAAF23754}" type="datetimeFigureOut">
               <a:rPr lang="en-US" smtClean="0"/>
-              <a:t>3/19/17</a:t>
+              <a:t>4/1/17</a:t>
             </a:fld>
             <a:endParaRPr lang="en-US"/>
           </a:p>
@@ -2452,7 +2453,7 @@
           <a:p>
             <a:fld id="{9C93B30E-FFF9-5B40-B7BA-CE3AAAF23754}" type="datetimeFigureOut">
               <a:rPr lang="en-US" smtClean="0"/>
-              <a:t>3/19/17</a:t>
+              <a:t>4/1/17</a:t>
             </a:fld>
             <a:endParaRPr lang="en-US"/>
           </a:p>
@@ -2705,7 +2706,7 @@
           <a:p>
             <a:fld id="{9C93B30E-FFF9-5B40-B7BA-CE3AAAF23754}" type="datetimeFigureOut">
               <a:rPr lang="en-US" smtClean="0"/>
-              <a:t>3/19/17</a:t>
+              <a:t>4/1/17</a:t>
             </a:fld>
             <a:endParaRPr lang="en-US"/>
           </a:p>
@@ -2918,7 +2919,7 @@
           <a:p>
             <a:fld id="{9C93B30E-FFF9-5B40-B7BA-CE3AAAF23754}" type="datetimeFigureOut">
               <a:rPr lang="en-US" smtClean="0"/>
-              <a:t>3/19/17</a:t>
+              <a:t>4/1/17</a:t>
             </a:fld>
             <a:endParaRPr lang="en-US"/>
           </a:p>
@@ -3636,6 +3637,321 @@
     <p:extLst>
       <p:ext uri="{BB962C8B-B14F-4D97-AF65-F5344CB8AC3E}">
         <p14:creationId xmlns:p14="http://schemas.microsoft.com/office/powerpoint/2010/main" val="865223115"/>
+      </p:ext>
+    </p:extLst>
+  </p:cSld>
+  <p:clrMapOvr>
+    <a:masterClrMapping/>
+  </p:clrMapOvr>
+</p:sld>
+</file>
+
+<file path=ppt/slides/slide3.xml><?xml version="1.0" encoding="utf-8"?>
+<p:sld xmlns:a="http://schemas.openxmlformats.org/drawingml/2006/main" xmlns:r="http://schemas.openxmlformats.org/officeDocument/2006/relationships" xmlns:p="http://schemas.openxmlformats.org/presentationml/2006/main">
+  <p:cSld>
+    <p:spTree>
+      <p:nvGrpSpPr>
+        <p:cNvPr id="1" name=""/>
+        <p:cNvGrpSpPr/>
+        <p:nvPr/>
+      </p:nvGrpSpPr>
+      <p:grpSpPr>
+        <a:xfrm>
+          <a:off x="0" y="0"/>
+          <a:ext cx="0" cy="0"/>
+          <a:chOff x="0" y="0"/>
+          <a:chExt cx="0" cy="0"/>
+        </a:xfrm>
+      </p:grpSpPr>
+      <p:sp>
+        <p:nvSpPr>
+          <p:cNvPr id="16" name="Rectangle 15"/>
+          <p:cNvSpPr/>
+          <p:nvPr/>
+        </p:nvSpPr>
+        <p:spPr>
+          <a:xfrm>
+            <a:off x="1514475" y="1133475"/>
+            <a:ext cx="9810750" cy="2333625"/>
+          </a:xfrm>
+          <a:prstGeom prst="rect">
+            <a:avLst/>
+          </a:prstGeom>
+          <a:solidFill>
+            <a:schemeClr val="bg1">
+              <a:lumMod val="95000"/>
+            </a:schemeClr>
+          </a:solidFill>
+          <a:ln>
+            <a:noFill/>
+          </a:ln>
+        </p:spPr>
+        <p:style>
+          <a:lnRef idx="1">
+            <a:schemeClr val="accent4"/>
+          </a:lnRef>
+          <a:fillRef idx="2">
+            <a:schemeClr val="accent4"/>
+          </a:fillRef>
+          <a:effectRef idx="1">
+            <a:schemeClr val="accent4"/>
+          </a:effectRef>
+          <a:fontRef idx="minor">
+            <a:schemeClr val="dk1"/>
+          </a:fontRef>
+        </p:style>
+        <p:txBody>
+          <a:bodyPr rtlCol="0" anchor="ctr"/>
+          <a:lstStyle/>
+          <a:p>
+            <a:pPr algn="ctr"/>
+            <a:endParaRPr lang="en-US"/>
+          </a:p>
+        </p:txBody>
+      </p:sp>
+      <p:pic>
+        <p:nvPicPr>
+          <p:cNvPr id="6" name="Picture 5"/>
+          <p:cNvPicPr>
+            <a:picLocks noChangeAspect="1"/>
+          </p:cNvPicPr>
+          <p:nvPr/>
+        </p:nvPicPr>
+        <p:blipFill>
+          <a:blip r:embed="rId2">
+            <a:duotone>
+              <a:schemeClr val="accent6">
+                <a:shade val="45000"/>
+                <a:satMod val="135000"/>
+              </a:schemeClr>
+              <a:prstClr val="white"/>
+            </a:duotone>
+            <a:extLst>
+              <a:ext uri="{28A0092B-C50C-407E-A947-70E740481C1C}">
+                <a14:useLocalDpi xmlns:a14="http://schemas.microsoft.com/office/drawing/2010/main" val="0"/>
+              </a:ext>
+            </a:extLst>
+          </a:blip>
+          <a:stretch>
+            <a:fillRect/>
+          </a:stretch>
+        </p:blipFill>
+        <p:spPr>
+          <a:xfrm>
+            <a:off x="7051676" y="1514984"/>
+            <a:ext cx="1641600" cy="1641600"/>
+          </a:xfrm>
+          <a:prstGeom prst="rect">
+            <a:avLst/>
+          </a:prstGeom>
+        </p:spPr>
+      </p:pic>
+      <p:pic>
+        <p:nvPicPr>
+          <p:cNvPr id="8" name="Picture 7"/>
+          <p:cNvPicPr>
+            <a:picLocks noChangeAspect="1"/>
+          </p:cNvPicPr>
+          <p:nvPr/>
+        </p:nvPicPr>
+        <p:blipFill>
+          <a:blip r:embed="rId3">
+            <a:extLst>
+              <a:ext uri="{28A0092B-C50C-407E-A947-70E740481C1C}">
+                <a14:useLocalDpi xmlns:a14="http://schemas.microsoft.com/office/drawing/2010/main" val="0"/>
+              </a:ext>
+            </a:extLst>
+          </a:blip>
+          <a:stretch>
+            <a:fillRect/>
+          </a:stretch>
+        </p:blipFill>
+        <p:spPr>
+          <a:xfrm>
+            <a:off x="1715063" y="1402377"/>
+            <a:ext cx="1638300" cy="1754205"/>
+          </a:xfrm>
+          <a:prstGeom prst="rect">
+            <a:avLst/>
+          </a:prstGeom>
+        </p:spPr>
+      </p:pic>
+      <p:pic>
+        <p:nvPicPr>
+          <p:cNvPr id="9" name="Picture 8"/>
+          <p:cNvPicPr>
+            <a:picLocks noChangeAspect="1"/>
+          </p:cNvPicPr>
+          <p:nvPr/>
+        </p:nvPicPr>
+        <p:blipFill>
+          <a:blip r:embed="rId4">
+            <a:extLst>
+              <a:ext uri="{28A0092B-C50C-407E-A947-70E740481C1C}">
+                <a14:useLocalDpi xmlns:a14="http://schemas.microsoft.com/office/drawing/2010/main" val="0"/>
+              </a:ext>
+            </a:extLst>
+          </a:blip>
+          <a:stretch>
+            <a:fillRect/>
+          </a:stretch>
+        </p:blipFill>
+        <p:spPr>
+          <a:xfrm>
+            <a:off x="4491755" y="1402378"/>
+            <a:ext cx="1638300" cy="1754205"/>
+          </a:xfrm>
+          <a:prstGeom prst="rect">
+            <a:avLst/>
+          </a:prstGeom>
+        </p:spPr>
+      </p:pic>
+      <p:sp>
+        <p:nvSpPr>
+          <p:cNvPr id="12" name="Plus 11"/>
+          <p:cNvSpPr/>
+          <p:nvPr/>
+        </p:nvSpPr>
+        <p:spPr>
+          <a:xfrm>
+            <a:off x="3461748" y="1874668"/>
+            <a:ext cx="921621" cy="809625"/>
+          </a:xfrm>
+          <a:prstGeom prst="mathPlus">
+            <a:avLst/>
+          </a:prstGeom>
+        </p:spPr>
+        <p:style>
+          <a:lnRef idx="1">
+            <a:schemeClr val="accent3"/>
+          </a:lnRef>
+          <a:fillRef idx="2">
+            <a:schemeClr val="accent3"/>
+          </a:fillRef>
+          <a:effectRef idx="1">
+            <a:schemeClr val="accent3"/>
+          </a:effectRef>
+          <a:fontRef idx="minor">
+            <a:schemeClr val="dk1"/>
+          </a:fontRef>
+        </p:style>
+        <p:txBody>
+          <a:bodyPr rtlCol="0" anchor="ctr"/>
+          <a:lstStyle/>
+          <a:p>
+            <a:pPr algn="ctr"/>
+            <a:endParaRPr lang="en-US"/>
+          </a:p>
+        </p:txBody>
+      </p:sp>
+      <p:sp>
+        <p:nvSpPr>
+          <p:cNvPr id="13" name="Plus 12"/>
+          <p:cNvSpPr/>
+          <p:nvPr/>
+        </p:nvSpPr>
+        <p:spPr>
+          <a:xfrm>
+            <a:off x="6130055" y="1823065"/>
+            <a:ext cx="921621" cy="809625"/>
+          </a:xfrm>
+          <a:prstGeom prst="mathPlus">
+            <a:avLst/>
+          </a:prstGeom>
+        </p:spPr>
+        <p:style>
+          <a:lnRef idx="1">
+            <a:schemeClr val="accent3"/>
+          </a:lnRef>
+          <a:fillRef idx="2">
+            <a:schemeClr val="accent3"/>
+          </a:fillRef>
+          <a:effectRef idx="1">
+            <a:schemeClr val="accent3"/>
+          </a:effectRef>
+          <a:fontRef idx="minor">
+            <a:schemeClr val="dk1"/>
+          </a:fontRef>
+        </p:style>
+        <p:txBody>
+          <a:bodyPr rtlCol="0" anchor="ctr"/>
+          <a:lstStyle/>
+          <a:p>
+            <a:pPr algn="ctr"/>
+            <a:endParaRPr lang="en-US"/>
+          </a:p>
+        </p:txBody>
+      </p:sp>
+      <p:sp>
+        <p:nvSpPr>
+          <p:cNvPr id="14" name="Equal 13"/>
+          <p:cNvSpPr/>
+          <p:nvPr/>
+        </p:nvSpPr>
+        <p:spPr>
+          <a:xfrm>
+            <a:off x="8689976" y="1913552"/>
+            <a:ext cx="838200" cy="628650"/>
+          </a:xfrm>
+          <a:prstGeom prst="mathEqual">
+            <a:avLst/>
+          </a:prstGeom>
+        </p:spPr>
+        <p:style>
+          <a:lnRef idx="1">
+            <a:schemeClr val="accent3"/>
+          </a:lnRef>
+          <a:fillRef idx="2">
+            <a:schemeClr val="accent3"/>
+          </a:fillRef>
+          <a:effectRef idx="1">
+            <a:schemeClr val="accent3"/>
+          </a:effectRef>
+          <a:fontRef idx="minor">
+            <a:schemeClr val="dk1"/>
+          </a:fontRef>
+        </p:style>
+        <p:txBody>
+          <a:bodyPr rtlCol="0" anchor="ctr"/>
+          <a:lstStyle/>
+          <a:p>
+            <a:pPr algn="ctr"/>
+            <a:endParaRPr lang="en-US">
+              <a:solidFill>
+                <a:schemeClr val="tx1"/>
+              </a:solidFill>
+            </a:endParaRPr>
+          </a:p>
+        </p:txBody>
+      </p:sp>
+      <p:pic>
+        <p:nvPicPr>
+          <p:cNvPr id="15" name="Picture 14"/>
+          <p:cNvPicPr>
+            <a:picLocks noChangeAspect="1"/>
+          </p:cNvPicPr>
+          <p:nvPr/>
+        </p:nvPicPr>
+        <p:blipFill>
+          <a:blip r:embed="rId5"/>
+          <a:stretch>
+            <a:fillRect/>
+          </a:stretch>
+        </p:blipFill>
+        <p:spPr>
+          <a:xfrm flipH="1">
+            <a:off x="9614895" y="1514985"/>
+            <a:ext cx="1579031" cy="1641600"/>
+          </a:xfrm>
+          <a:prstGeom prst="rect">
+            <a:avLst/>
+          </a:prstGeom>
+        </p:spPr>
+      </p:pic>
+    </p:spTree>
+    <p:extLst>
+      <p:ext uri="{BB962C8B-B14F-4D97-AF65-F5344CB8AC3E}">
+        <p14:creationId xmlns:p14="http://schemas.microsoft.com/office/powerpoint/2010/main" val="21757461"/>
       </p:ext>
     </p:extLst>
   </p:cSld>

</xml_diff>